<commit_message>
Update the talk with another slide.
</commit_message>
<xml_diff>
--- a/TheContainerTalk.pptx
+++ b/TheContainerTalk.pptx
@@ -23,7 +23,8 @@
     <p:sldId id="271" r:id="rId17"/>
     <p:sldId id="272" r:id="rId18"/>
     <p:sldId id="273" r:id="rId19"/>
-    <p:sldId id="274" r:id="rId20"/>
+    <p:sldId id="275" r:id="rId20"/>
+    <p:sldId id="274" r:id="rId21"/>
   </p:sldIdLst>
   <p:sldSz cx="12192000" cy="6858000"/>
   <p:notesSz cx="6858000" cy="9144000"/>
@@ -7815,21 +7816,6 @@
               <a:rPr lang="en-US" dirty="0" smtClean="0"/>
               <a:t>, CNTK</a:t>
             </a:r>
-          </a:p>
-          <a:p>
-            <a:pPr lvl="1"/>
-            <a:r>
-              <a:rPr lang="en-US" dirty="0" smtClean="0"/>
-              <a:t>Creates a Singularity image on </a:t>
-            </a:r>
-            <a:r>
-              <a:rPr lang="en-US" dirty="0" err="1" smtClean="0"/>
-              <a:t>Rostam</a:t>
-            </a:r>
-            <a:r>
-              <a:rPr lang="en-US" dirty="0" smtClean="0"/>
-              <a:t>…</a:t>
-            </a:r>
             <a:endParaRPr lang="en-US" dirty="0"/>
           </a:p>
         </p:txBody>
@@ -7881,7 +7867,11 @@
           <a:p>
             <a:r>
               <a:rPr lang="en-US" dirty="0" smtClean="0"/>
-              <a:t>What is Singularity?</a:t>
+              <a:t>Using </a:t>
+            </a:r>
+            <a:r>
+              <a:rPr lang="en-US" dirty="0" err="1" smtClean="0"/>
+              <a:t>phylanx.devenv</a:t>
             </a:r>
             <a:endParaRPr lang="en-US" dirty="0"/>
           </a:p>
@@ -7904,113 +7894,137 @@
           <a:p>
             <a:r>
               <a:rPr lang="en-US" dirty="0" smtClean="0"/>
-              <a:t>Docker needs access to root.</a:t>
-            </a:r>
-          </a:p>
-          <a:p>
-            <a:pPr lvl="1"/>
-            <a:r>
-              <a:rPr lang="en-US" dirty="0" smtClean="0"/>
-              <a:t>Inherently insecure.</a:t>
-            </a:r>
-          </a:p>
-          <a:p>
-            <a:r>
-              <a:rPr lang="en-US" dirty="0" smtClean="0"/>
-              <a:t>Not used on HPC systems.</a:t>
-            </a:r>
-          </a:p>
-          <a:p>
-            <a:r>
-              <a:rPr lang="en-US" dirty="0" smtClean="0"/>
-              <a:t>Singularity is an alternative.</a:t>
-            </a:r>
-          </a:p>
-          <a:p>
-            <a:pPr lvl="1"/>
-            <a:r>
-              <a:rPr lang="en-US" dirty="0" smtClean="0"/>
-              <a:t>Also built on </a:t>
+              <a:t>“</a:t>
+            </a:r>
+            <a:r>
+              <a:rPr lang="en-US" dirty="0" err="1"/>
+              <a:t>docker</a:t>
+            </a:r>
+            <a:r>
+              <a:rPr lang="en-US" dirty="0"/>
+              <a:t> run --name </a:t>
+            </a:r>
+            <a:r>
+              <a:rPr lang="en-US" dirty="0" err="1"/>
+              <a:t>devenv</a:t>
+            </a:r>
+            <a:r>
+              <a:rPr lang="en-US" dirty="0"/>
+              <a:t> --privileged -v </a:t>
+            </a:r>
+            <a:r>
+              <a:rPr lang="en-US" dirty="0" err="1"/>
+              <a:t>devenv_homefs-phylanx</a:t>
+            </a:r>
+            <a:r>
+              <a:rPr lang="en-US" dirty="0"/>
+              <a:t>:/home/</a:t>
+            </a:r>
+            <a:r>
+              <a:rPr lang="en-US" dirty="0" err="1"/>
+              <a:t>jovyan</a:t>
+            </a:r>
+            <a:r>
+              <a:rPr lang="en-US" dirty="0"/>
+              <a:t> -d --</a:t>
+            </a:r>
+            <a:r>
+              <a:rPr lang="en-US" dirty="0" err="1"/>
+              <a:t>rm</a:t>
+            </a:r>
+            <a:r>
+              <a:rPr lang="en-US" dirty="0"/>
+              <a:t> </a:t>
+            </a:r>
+            <a:r>
+              <a:rPr lang="en-US" dirty="0" err="1" smtClean="0"/>
+              <a:t>stevenrbrandt</a:t>
+            </a:r>
+            <a:r>
+              <a:rPr lang="en-US" dirty="0" smtClean="0"/>
+              <a:t>/</a:t>
+            </a:r>
+            <a:r>
+              <a:rPr lang="en-US" dirty="0" err="1" smtClean="0"/>
+              <a:t>phylanx.devenv:working</a:t>
+            </a:r>
+            <a:r>
+              <a:rPr lang="en-US" dirty="0" smtClean="0"/>
+              <a:t>”</a:t>
+            </a:r>
+          </a:p>
+          <a:p>
+            <a:r>
+              <a:rPr lang="en-US" dirty="0" smtClean="0"/>
+              <a:t>The “CMD” in the image is [“sleep”, “infinity”]</a:t>
+            </a:r>
+          </a:p>
+          <a:p>
+            <a:r>
+              <a:rPr lang="en-US" dirty="0" smtClean="0"/>
+              <a:t>The “-d” runs the image in the background</a:t>
+            </a:r>
+          </a:p>
+          <a:p>
+            <a:r>
+              <a:rPr lang="en-US" dirty="0" smtClean="0"/>
+              <a:t>I “login” to the image by typing “</a:t>
+            </a:r>
+            <a:r>
+              <a:rPr lang="en-US" dirty="0" err="1" smtClean="0"/>
+              <a:t>docker</a:t>
+            </a:r>
+            <a:r>
+              <a:rPr lang="en-US" dirty="0" smtClean="0"/>
+              <a:t> exec –it </a:t>
+            </a:r>
+            <a:r>
+              <a:rPr lang="en-US" dirty="0" err="1" smtClean="0"/>
+              <a:t>devenv</a:t>
+            </a:r>
+            <a:r>
+              <a:rPr lang="en-US" dirty="0" smtClean="0"/>
+              <a:t> bash”</a:t>
+            </a:r>
+          </a:p>
+          <a:p>
+            <a:r>
+              <a:rPr lang="en-US" dirty="0" smtClean="0"/>
+              <a:t>You can think of “</a:t>
+            </a:r>
+            <a:r>
+              <a:rPr lang="en-US" dirty="0" err="1" smtClean="0"/>
+              <a:t>docker</a:t>
+            </a:r>
+            <a:r>
+              <a:rPr lang="en-US" dirty="0" smtClean="0"/>
+              <a:t> exec” as being like “</a:t>
+            </a:r>
+            <a:r>
+              <a:rPr lang="en-US" dirty="0" err="1" smtClean="0"/>
+              <a:t>ssh</a:t>
+            </a:r>
+            <a:r>
+              <a:rPr lang="en-US" dirty="0" smtClean="0"/>
+              <a:t>”</a:t>
+            </a:r>
+          </a:p>
+          <a:p>
+            <a:r>
+              <a:rPr lang="en-US" dirty="0" smtClean="0"/>
+              <a:t>The other way to use the </a:t>
+            </a:r>
+            <a:r>
+              <a:rPr lang="en-US" dirty="0" err="1" smtClean="0"/>
+              <a:t>phylanx.devenv</a:t>
+            </a:r>
+            <a:r>
+              <a:rPr lang="en-US" dirty="0" smtClean="0"/>
+              <a:t> image is </a:t>
             </a:r>
             <a:r>
               <a:rPr lang="en-US" smtClean="0"/>
-              <a:t>golang</a:t>
-            </a:r>
-            <a:endParaRPr lang="en-US" dirty="0" smtClean="0"/>
-          </a:p>
-          <a:p>
-            <a:r>
-              <a:rPr lang="en-US" dirty="0" smtClean="0"/>
-              <a:t>“singularity build –F ~/images/</a:t>
-            </a:r>
-            <a:r>
-              <a:rPr lang="en-US" dirty="0" err="1" smtClean="0"/>
-              <a:t>phylanx.devenv</a:t>
-            </a:r>
-            <a:r>
-              <a:rPr lang="en-US" dirty="0" smtClean="0"/>
-              <a:t> </a:t>
-            </a:r>
-            <a:r>
-              <a:rPr lang="en-US" dirty="0" err="1" smtClean="0"/>
-              <a:t>docker</a:t>
-            </a:r>
-            <a:r>
-              <a:rPr lang="en-US" dirty="0" smtClean="0"/>
-              <a:t>://</a:t>
-            </a:r>
-            <a:r>
-              <a:rPr lang="en-US" dirty="0" err="1" smtClean="0"/>
-              <a:t>stevenrbrandt</a:t>
-            </a:r>
-            <a:r>
-              <a:rPr lang="en-US" dirty="0" smtClean="0"/>
-              <a:t>/</a:t>
-            </a:r>
-            <a:r>
-              <a:rPr lang="en-US" dirty="0" err="1" smtClean="0"/>
-              <a:t>phylanx.devenv:working</a:t>
-            </a:r>
-            <a:r>
-              <a:rPr lang="en-US" dirty="0" smtClean="0"/>
-              <a:t>”</a:t>
-            </a:r>
-          </a:p>
-          <a:p>
-            <a:r>
-              <a:rPr lang="en-US" dirty="0" smtClean="0"/>
-              <a:t>“</a:t>
-            </a:r>
-            <a:r>
-              <a:rPr lang="en-US" dirty="0"/>
-              <a:t>singularity shell ~/</a:t>
-            </a:r>
-            <a:r>
-              <a:rPr lang="en-US" dirty="0" smtClean="0"/>
-              <a:t>images/</a:t>
-            </a:r>
-            <a:r>
-              <a:rPr lang="en-US" dirty="0" err="1" smtClean="0"/>
-              <a:t>phylanx-devenv.simg</a:t>
-            </a:r>
-            <a:r>
-              <a:rPr lang="en-US" dirty="0" smtClean="0"/>
-              <a:t>”</a:t>
-            </a:r>
-          </a:p>
-          <a:p>
-            <a:pPr lvl="1"/>
-            <a:r>
-              <a:rPr lang="en-US" dirty="0" smtClean="0"/>
-              <a:t>Now you can type “build.sh” to build </a:t>
-            </a:r>
-            <a:r>
-              <a:rPr lang="en-US" dirty="0" err="1" smtClean="0"/>
-              <a:t>Phylanx</a:t>
-            </a:r>
-            <a:r>
-              <a:rPr lang="en-US" dirty="0" smtClean="0"/>
-              <a:t>.</a:t>
+              <a:t>with Singularity…</a:t>
             </a:r>
             <a:endParaRPr lang="en-US" dirty="0"/>
           </a:p>
@@ -8019,7 +8033,7 @@
     </p:spTree>
     <p:extLst>
       <p:ext uri="{BB962C8B-B14F-4D97-AF65-F5344CB8AC3E}">
-        <p14:creationId xmlns:p14="http://schemas.microsoft.com/office/powerpoint/2010/main" val="3928724949"/>
+        <p14:creationId xmlns:p14="http://schemas.microsoft.com/office/powerpoint/2010/main" val="2273270925"/>
       </p:ext>
     </p:extLst>
   </p:cSld>
@@ -8131,6 +8145,188 @@
     <p:extLst>
       <p:ext uri="{BB962C8B-B14F-4D97-AF65-F5344CB8AC3E}">
         <p14:creationId xmlns:p14="http://schemas.microsoft.com/office/powerpoint/2010/main" val="17605667"/>
+      </p:ext>
+    </p:extLst>
+  </p:cSld>
+  <p:clrMapOvr>
+    <a:masterClrMapping/>
+  </p:clrMapOvr>
+</p:sld>
+</file>
+
+<file path=ppt/slides/slide20.xml><?xml version="1.0" encoding="utf-8"?>
+<p:sld xmlns:a="http://schemas.openxmlformats.org/drawingml/2006/main" xmlns:r="http://schemas.openxmlformats.org/officeDocument/2006/relationships" xmlns:p="http://schemas.openxmlformats.org/presentationml/2006/main">
+  <p:cSld>
+    <p:spTree>
+      <p:nvGrpSpPr>
+        <p:cNvPr id="1" name=""/>
+        <p:cNvGrpSpPr/>
+        <p:nvPr/>
+      </p:nvGrpSpPr>
+      <p:grpSpPr>
+        <a:xfrm>
+          <a:off x="0" y="0"/>
+          <a:ext cx="0" cy="0"/>
+          <a:chOff x="0" y="0"/>
+          <a:chExt cx="0" cy="0"/>
+        </a:xfrm>
+      </p:grpSpPr>
+      <p:sp>
+        <p:nvSpPr>
+          <p:cNvPr id="2" name="Title 1"/>
+          <p:cNvSpPr>
+            <a:spLocks noGrp="1"/>
+          </p:cNvSpPr>
+          <p:nvPr>
+            <p:ph type="title"/>
+          </p:nvPr>
+        </p:nvSpPr>
+        <p:spPr/>
+        <p:txBody>
+          <a:bodyPr/>
+          <a:lstStyle/>
+          <a:p>
+            <a:r>
+              <a:rPr lang="en-US" dirty="0" smtClean="0"/>
+              <a:t>What is Singularity?</a:t>
+            </a:r>
+            <a:endParaRPr lang="en-US" dirty="0"/>
+          </a:p>
+        </p:txBody>
+      </p:sp>
+      <p:sp>
+        <p:nvSpPr>
+          <p:cNvPr id="3" name="Content Placeholder 2"/>
+          <p:cNvSpPr>
+            <a:spLocks noGrp="1"/>
+          </p:cNvSpPr>
+          <p:nvPr>
+            <p:ph idx="1"/>
+          </p:nvPr>
+        </p:nvSpPr>
+        <p:spPr/>
+        <p:txBody>
+          <a:bodyPr/>
+          <a:lstStyle/>
+          <a:p>
+            <a:r>
+              <a:rPr lang="en-US" dirty="0" smtClean="0"/>
+              <a:t>Docker needs access to root.</a:t>
+            </a:r>
+          </a:p>
+          <a:p>
+            <a:pPr lvl="1"/>
+            <a:r>
+              <a:rPr lang="en-US" dirty="0" smtClean="0"/>
+              <a:t>Inherently insecure.</a:t>
+            </a:r>
+          </a:p>
+          <a:p>
+            <a:r>
+              <a:rPr lang="en-US" dirty="0" smtClean="0"/>
+              <a:t>Not used on HPC systems.</a:t>
+            </a:r>
+          </a:p>
+          <a:p>
+            <a:r>
+              <a:rPr lang="en-US" dirty="0" smtClean="0"/>
+              <a:t>Singularity is an alternative.</a:t>
+            </a:r>
+          </a:p>
+          <a:p>
+            <a:pPr lvl="1"/>
+            <a:r>
+              <a:rPr lang="en-US" dirty="0" smtClean="0"/>
+              <a:t>Also built on </a:t>
+            </a:r>
+            <a:r>
+              <a:rPr lang="en-US" dirty="0" err="1" smtClean="0"/>
+              <a:t>golang</a:t>
+            </a:r>
+            <a:endParaRPr lang="en-US" dirty="0" smtClean="0"/>
+          </a:p>
+          <a:p>
+            <a:r>
+              <a:rPr lang="en-US" dirty="0" smtClean="0"/>
+              <a:t>“singularity build –F ~/images/</a:t>
+            </a:r>
+            <a:r>
+              <a:rPr lang="en-US" dirty="0" err="1" smtClean="0"/>
+              <a:t>phylanx.devenv</a:t>
+            </a:r>
+            <a:r>
+              <a:rPr lang="en-US" dirty="0" smtClean="0"/>
+              <a:t> </a:t>
+            </a:r>
+            <a:r>
+              <a:rPr lang="en-US" dirty="0" err="1" smtClean="0"/>
+              <a:t>docker</a:t>
+            </a:r>
+            <a:r>
+              <a:rPr lang="en-US" dirty="0" smtClean="0"/>
+              <a:t>://</a:t>
+            </a:r>
+            <a:r>
+              <a:rPr lang="en-US" dirty="0" err="1" smtClean="0"/>
+              <a:t>stevenrbrandt</a:t>
+            </a:r>
+            <a:r>
+              <a:rPr lang="en-US" dirty="0" smtClean="0"/>
+              <a:t>/</a:t>
+            </a:r>
+            <a:r>
+              <a:rPr lang="en-US" dirty="0" err="1" smtClean="0"/>
+              <a:t>phylanx.devenv:working</a:t>
+            </a:r>
+            <a:r>
+              <a:rPr lang="en-US" dirty="0" smtClean="0"/>
+              <a:t>”</a:t>
+            </a:r>
+          </a:p>
+          <a:p>
+            <a:r>
+              <a:rPr lang="en-US" dirty="0" smtClean="0"/>
+              <a:t>“</a:t>
+            </a:r>
+            <a:r>
+              <a:rPr lang="en-US" dirty="0"/>
+              <a:t>singularity shell ~/</a:t>
+            </a:r>
+            <a:r>
+              <a:rPr lang="en-US" dirty="0" smtClean="0"/>
+              <a:t>images/</a:t>
+            </a:r>
+            <a:r>
+              <a:rPr lang="en-US" dirty="0" err="1" smtClean="0"/>
+              <a:t>phylanx-devenv.simg</a:t>
+            </a:r>
+            <a:r>
+              <a:rPr lang="en-US" dirty="0" smtClean="0"/>
+              <a:t>”</a:t>
+            </a:r>
+          </a:p>
+          <a:p>
+            <a:pPr lvl="1"/>
+            <a:r>
+              <a:rPr lang="en-US" dirty="0" smtClean="0"/>
+              <a:t>Now you can type “build.sh” to build </a:t>
+            </a:r>
+            <a:r>
+              <a:rPr lang="en-US" dirty="0" err="1" smtClean="0"/>
+              <a:t>Phylanx</a:t>
+            </a:r>
+            <a:r>
+              <a:rPr lang="en-US" dirty="0" smtClean="0"/>
+              <a:t>.</a:t>
+            </a:r>
+            <a:endParaRPr lang="en-US" dirty="0"/>
+          </a:p>
+        </p:txBody>
+      </p:sp>
+    </p:spTree>
+    <p:extLst>
+      <p:ext uri="{BB962C8B-B14F-4D97-AF65-F5344CB8AC3E}">
+        <p14:creationId xmlns:p14="http://schemas.microsoft.com/office/powerpoint/2010/main" val="3928724949"/>
       </p:ext>
     </p:extLst>
   </p:cSld>

</xml_diff>